<commit_message>
prepare 001 and 002
</commit_message>
<xml_diff>
--- a/contents-doingmathwithpython.pptx
+++ b/contents-doingmathwithpython.pptx
@@ -5,13 +5,14 @@
     <p:sldMasterId id="2147483648" r:id="rId1"/>
   </p:sldMasterIdLst>
   <p:notesMasterIdLst>
-    <p:notesMasterId r:id="rId3"/>
+    <p:notesMasterId r:id="rId4"/>
   </p:notesMasterIdLst>
   <p:handoutMasterIdLst>
-    <p:handoutMasterId r:id="rId4"/>
+    <p:handoutMasterId r:id="rId5"/>
   </p:handoutMasterIdLst>
   <p:sldIdLst>
-    <p:sldId id="258" r:id="rId2"/>
+    <p:sldId id="259" r:id="rId2"/>
+    <p:sldId id="258" r:id="rId3"/>
   </p:sldIdLst>
   <p:sldSz cx="12192000" cy="6858000"/>
   <p:notesSz cx="6858000" cy="9144000"/>
@@ -4064,6 +4065,486 @@
   <p:cSld>
     <p:spTree>
       <p:nvGrpSpPr>
+        <p:cNvPr id="1" name="">
+          <a:extLst>
+            <a:ext uri="{FF2B5EF4-FFF2-40B4-BE49-F238E27FC236}">
+              <a16:creationId xmlns:a16="http://schemas.microsoft.com/office/drawing/2014/main" id="{F837557A-9893-A6C5-A543-0832D77F27EC}"/>
+            </a:ext>
+          </a:extLst>
+        </p:cNvPr>
+        <p:cNvGrpSpPr/>
+        <p:nvPr/>
+      </p:nvGrpSpPr>
+      <p:grpSpPr>
+        <a:xfrm>
+          <a:off x="0" y="0"/>
+          <a:ext cx="0" cy="0"/>
+          <a:chOff x="0" y="0"/>
+          <a:chExt cx="0" cy="0"/>
+        </a:xfrm>
+      </p:grpSpPr>
+      <p:sp>
+        <p:nvSpPr>
+          <p:cNvPr id="2" name="Title 1">
+            <a:extLst>
+              <a:ext uri="{FF2B5EF4-FFF2-40B4-BE49-F238E27FC236}">
+                <a16:creationId xmlns:a16="http://schemas.microsoft.com/office/drawing/2014/main" id="{40253826-CC6F-3E47-1C89-8BBFC4E799BC}"/>
+              </a:ext>
+            </a:extLst>
+          </p:cNvPr>
+          <p:cNvSpPr>
+            <a:spLocks noGrp="1"/>
+          </p:cNvSpPr>
+          <p:nvPr>
+            <p:ph type="ctrTitle"/>
+          </p:nvPr>
+        </p:nvSpPr>
+        <p:spPr/>
+        <p:txBody>
+          <a:bodyPr>
+            <a:normAutofit/>
+          </a:bodyPr>
+          <a:lstStyle/>
+          <a:p>
+            <a:r>
+              <a:rPr lang="en-US" sz="5400" dirty="0"/>
+              <a:t>Doing Math with Python</a:t>
+            </a:r>
+            <a:br>
+              <a:rPr lang="en-US" sz="4000" dirty="0"/>
+            </a:br>
+            <a:br>
+              <a:rPr lang="en-US" sz="4000" dirty="0"/>
+            </a:br>
+            <a:r>
+              <a:rPr lang="en-US" sz="4000" dirty="0"/>
+              <a:t>Opening and Intro</a:t>
+            </a:r>
+          </a:p>
+        </p:txBody>
+      </p:sp>
+      <p:sp>
+        <p:nvSpPr>
+          <p:cNvPr id="3" name="Subtitle 2">
+            <a:extLst>
+              <a:ext uri="{FF2B5EF4-FFF2-40B4-BE49-F238E27FC236}">
+                <a16:creationId xmlns:a16="http://schemas.microsoft.com/office/drawing/2014/main" id="{D60F986B-9019-A688-7776-D8DE86026D7A}"/>
+              </a:ext>
+            </a:extLst>
+          </p:cNvPr>
+          <p:cNvSpPr>
+            <a:spLocks noGrp="1"/>
+          </p:cNvSpPr>
+          <p:nvPr>
+            <p:ph type="subTitle" idx="1"/>
+          </p:nvPr>
+        </p:nvSpPr>
+        <p:spPr/>
+        <p:txBody>
+          <a:bodyPr/>
+          <a:lstStyle/>
+          <a:p>
+            <a:pPr marL="0" indent="0">
+              <a:buNone/>
+            </a:pPr>
+            <a:r>
+              <a:rPr lang="en-US" dirty="0"/>
+              <a:t>GitHub: </a:t>
+            </a:r>
+            <a:r>
+              <a:rPr lang="en-US" dirty="0">
+                <a:hlinkClick r:id="rId2"/>
+              </a:rPr>
+              <a:t>https://github.com/yasenstar/DoingMathWithPython</a:t>
+            </a:r>
+            <a:endParaRPr lang="en-US" dirty="0"/>
+          </a:p>
+          <a:p>
+            <a:pPr marL="0" indent="0">
+              <a:buNone/>
+            </a:pPr>
+            <a:r>
+              <a:rPr lang="en-US" dirty="0"/>
+              <a:t>Gitee: </a:t>
+            </a:r>
+            <a:r>
+              <a:rPr lang="en-US" dirty="0">
+                <a:hlinkClick r:id="rId3"/>
+              </a:rPr>
+              <a:t>https://gitee.com/yasenstar/DoingMathWithPython</a:t>
+            </a:r>
+            <a:endParaRPr lang="en-US" dirty="0"/>
+          </a:p>
+        </p:txBody>
+      </p:sp>
+      <p:pic>
+        <p:nvPicPr>
+          <p:cNvPr id="1026" name="Picture 2" descr="Getting started coding Python in Intellij IED">
+            <a:extLst>
+              <a:ext uri="{FF2B5EF4-FFF2-40B4-BE49-F238E27FC236}">
+                <a16:creationId xmlns:a16="http://schemas.microsoft.com/office/drawing/2014/main" id="{0CF2A89D-E66D-F7DE-6AC6-BDA3AB3D8E82}"/>
+              </a:ext>
+            </a:extLst>
+          </p:cNvPr>
+          <p:cNvPicPr>
+            <a:picLocks noChangeAspect="1" noChangeArrowheads="1"/>
+          </p:cNvPicPr>
+          <p:nvPr/>
+        </p:nvPicPr>
+        <p:blipFill>
+          <a:blip r:embed="rId4" cstate="print">
+            <a:extLst>
+              <a:ext uri="{28A0092B-C50C-407E-A947-70E740481C1C}">
+                <a14:useLocalDpi xmlns:a14="http://schemas.microsoft.com/office/drawing/2010/main" val="0"/>
+              </a:ext>
+            </a:extLst>
+          </a:blip>
+          <a:srcRect/>
+          <a:stretch>
+            <a:fillRect/>
+          </a:stretch>
+        </p:blipFill>
+        <p:spPr bwMode="auto">
+          <a:xfrm>
+            <a:off x="650266" y="1628734"/>
+            <a:ext cx="1228060" cy="1148830"/>
+          </a:xfrm>
+          <a:prstGeom prst="roundRect">
+            <a:avLst>
+              <a:gd name="adj" fmla="val 16667"/>
+            </a:avLst>
+          </a:prstGeom>
+          <a:ln>
+            <a:noFill/>
+          </a:ln>
+          <a:effectLst>
+            <a:outerShdw blurRad="76200" dist="38100" dir="7800000" algn="tl" rotWithShape="0">
+              <a:srgbClr val="000000">
+                <a:alpha val="40000"/>
+              </a:srgbClr>
+            </a:outerShdw>
+          </a:effectLst>
+          <a:scene3d>
+            <a:camera prst="orthographicFront"/>
+            <a:lightRig rig="contrasting" dir="t">
+              <a:rot lat="0" lon="0" rev="4200000"/>
+            </a:lightRig>
+          </a:scene3d>
+          <a:sp3d prstMaterial="plastic">
+            <a:bevelT w="381000" h="114300" prst="relaxedInset"/>
+            <a:contourClr>
+              <a:srgbClr val="969696"/>
+            </a:contourClr>
+          </a:sp3d>
+          <a:extLst>
+            <a:ext uri="{909E8E84-426E-40DD-AFC4-6F175D3DCCD1}">
+              <a14:hiddenFill xmlns:a14="http://schemas.microsoft.com/office/drawing/2010/main">
+                <a:solidFill>
+                  <a:srgbClr val="FFFFFF"/>
+                </a:solidFill>
+              </a14:hiddenFill>
+            </a:ext>
+          </a:extLst>
+        </p:spPr>
+      </p:pic>
+      <p:pic>
+        <p:nvPicPr>
+          <p:cNvPr id="1028" name="Picture 4" descr="Doing Math With Python by Amit Saha - Penguin Books Australia">
+            <a:extLst>
+              <a:ext uri="{FF2B5EF4-FFF2-40B4-BE49-F238E27FC236}">
+                <a16:creationId xmlns:a16="http://schemas.microsoft.com/office/drawing/2014/main" id="{D5426387-15CF-C680-736A-C3C87A193D9D}"/>
+              </a:ext>
+            </a:extLst>
+          </p:cNvPr>
+          <p:cNvPicPr>
+            <a:picLocks noChangeAspect="1" noChangeArrowheads="1"/>
+          </p:cNvPicPr>
+          <p:nvPr/>
+        </p:nvPicPr>
+        <p:blipFill>
+          <a:blip r:embed="rId5" cstate="print">
+            <a:extLst>
+              <a:ext uri="{28A0092B-C50C-407E-A947-70E740481C1C}">
+                <a14:useLocalDpi xmlns:a14="http://schemas.microsoft.com/office/drawing/2010/main" val="0"/>
+              </a:ext>
+            </a:extLst>
+          </a:blip>
+          <a:srcRect/>
+          <a:stretch>
+            <a:fillRect/>
+          </a:stretch>
+        </p:blipFill>
+        <p:spPr bwMode="auto">
+          <a:xfrm>
+            <a:off x="274453" y="3177523"/>
+            <a:ext cx="1796393" cy="2372452"/>
+          </a:xfrm>
+          <a:prstGeom prst="rect">
+            <a:avLst/>
+          </a:prstGeom>
+          <a:ln>
+            <a:noFill/>
+          </a:ln>
+          <a:effectLst>
+            <a:outerShdw blurRad="292100" dist="139700" dir="2700000" algn="tl" rotWithShape="0">
+              <a:srgbClr val="333333">
+                <a:alpha val="65000"/>
+              </a:srgbClr>
+            </a:outerShdw>
+          </a:effectLst>
+          <a:extLst>
+            <a:ext uri="{909E8E84-426E-40DD-AFC4-6F175D3DCCD1}">
+              <a14:hiddenFill xmlns:a14="http://schemas.microsoft.com/office/drawing/2010/main">
+                <a:solidFill>
+                  <a:srgbClr val="FFFFFF"/>
+                </a:solidFill>
+              </a14:hiddenFill>
+            </a:ext>
+          </a:extLst>
+        </p:spPr>
+      </p:pic>
+      <p:sp>
+        <p:nvSpPr>
+          <p:cNvPr id="12" name="TextBox 11">
+            <a:extLst>
+              <a:ext uri="{FF2B5EF4-FFF2-40B4-BE49-F238E27FC236}">
+                <a16:creationId xmlns:a16="http://schemas.microsoft.com/office/drawing/2014/main" id="{FE8E3392-2BD9-0329-79D9-C2A984FE2845}"/>
+              </a:ext>
+            </a:extLst>
+          </p:cNvPr>
+          <p:cNvSpPr txBox="1"/>
+          <p:nvPr/>
+        </p:nvSpPr>
+        <p:spPr>
+          <a:xfrm>
+            <a:off x="295206" y="808845"/>
+            <a:ext cx="1892077" cy="677108"/>
+          </a:xfrm>
+          <a:prstGeom prst="rect">
+            <a:avLst/>
+          </a:prstGeom>
+        </p:spPr>
+        <p:txBody>
+          <a:bodyPr vert="horz" lIns="91440" tIns="45720" rIns="91440" bIns="45720" rtlCol="0" anchor="ctr">
+            <a:noAutofit/>
+          </a:bodyPr>
+          <a:lstStyle>
+            <a:lvl1pPr>
+              <a:lnSpc>
+                <a:spcPct val="95000"/>
+              </a:lnSpc>
+              <a:spcBef>
+                <a:spcPct val="0"/>
+              </a:spcBef>
+              <a:buNone/>
+              <a:defRPr sz="4000">
+                <a:solidFill>
+                  <a:schemeClr val="bg1"/>
+                </a:solidFill>
+                <a:latin typeface="+mj-lt"/>
+                <a:ea typeface="+mj-ea"/>
+                <a:cs typeface="+mj-cs"/>
+              </a:defRPr>
+            </a:lvl1pPr>
+          </a:lstStyle>
+          <a:p>
+            <a:pPr algn="ctr"/>
+            <a:r>
+              <a:rPr lang="en-US" sz="6600" b="1" dirty="0">
+                <a:effectLst>
+                  <a:outerShdw blurRad="38100" dist="38100" dir="2700000" algn="tl">
+                    <a:srgbClr val="000000">
+                      <a:alpha val="43137"/>
+                    </a:srgbClr>
+                  </a:outerShdw>
+                </a:effectLst>
+              </a:rPr>
+              <a:t>001</a:t>
+            </a:r>
+          </a:p>
+        </p:txBody>
+      </p:sp>
+      <p:grpSp>
+        <p:nvGrpSpPr>
+          <p:cNvPr id="4" name="Group 3">
+            <a:extLst>
+              <a:ext uri="{FF2B5EF4-FFF2-40B4-BE49-F238E27FC236}">
+                <a16:creationId xmlns:a16="http://schemas.microsoft.com/office/drawing/2014/main" id="{D5D0FD3A-B905-2962-9F62-0093DD6E8E5C}"/>
+              </a:ext>
+            </a:extLst>
+          </p:cNvPr>
+          <p:cNvGrpSpPr/>
+          <p:nvPr/>
+        </p:nvGrpSpPr>
+        <p:grpSpPr>
+          <a:xfrm>
+            <a:off x="9144000" y="6143750"/>
+            <a:ext cx="2807208" cy="588020"/>
+            <a:chOff x="9034272" y="6189470"/>
+            <a:chExt cx="2807208" cy="588020"/>
+          </a:xfrm>
+        </p:grpSpPr>
+        <p:sp>
+          <p:nvSpPr>
+            <p:cNvPr id="6" name="Rectangle: Rounded Corners 5">
+              <a:extLst>
+                <a:ext uri="{FF2B5EF4-FFF2-40B4-BE49-F238E27FC236}">
+                  <a16:creationId xmlns:a16="http://schemas.microsoft.com/office/drawing/2014/main" id="{50A9C494-3A85-6284-3A05-3CF74B43B9F4}"/>
+                </a:ext>
+              </a:extLst>
+            </p:cNvPr>
+            <p:cNvSpPr/>
+            <p:nvPr/>
+          </p:nvSpPr>
+          <p:spPr>
+            <a:xfrm>
+              <a:off x="9034272" y="6189470"/>
+              <a:ext cx="2807208" cy="588020"/>
+            </a:xfrm>
+            <a:prstGeom prst="roundRect">
+              <a:avLst/>
+            </a:prstGeom>
+            <a:solidFill>
+              <a:schemeClr val="accent1">
+                <a:lumMod val="20000"/>
+                <a:lumOff val="80000"/>
+              </a:schemeClr>
+            </a:solidFill>
+            <a:ln>
+              <a:noFill/>
+            </a:ln>
+          </p:spPr>
+          <p:style>
+            <a:lnRef idx="2">
+              <a:schemeClr val="accent1">
+                <a:shade val="15000"/>
+              </a:schemeClr>
+            </a:lnRef>
+            <a:fillRef idx="1">
+              <a:schemeClr val="accent1"/>
+            </a:fillRef>
+            <a:effectRef idx="0">
+              <a:schemeClr val="accent1"/>
+            </a:effectRef>
+            <a:fontRef idx="minor">
+              <a:schemeClr val="lt1"/>
+            </a:fontRef>
+          </p:style>
+          <p:txBody>
+            <a:bodyPr rtlCol="0" anchor="ctr"/>
+            <a:lstStyle/>
+            <a:p>
+              <a:pPr algn="r"/>
+              <a:r>
+                <a:rPr lang="en-US" sz="1200" dirty="0">
+                  <a:ln w="0"/>
+                  <a:solidFill>
+                    <a:schemeClr val="tx1"/>
+                  </a:solidFill>
+                  <a:effectLst>
+                    <a:outerShdw blurRad="38100" dist="19050" dir="2700000" algn="tl" rotWithShape="0">
+                      <a:schemeClr val="dk1">
+                        <a:alpha val="40000"/>
+                      </a:schemeClr>
+                    </a:outerShdw>
+                  </a:effectLst>
+                </a:rPr>
+                <a:t>Yasen – Enterprise Architecture</a:t>
+              </a:r>
+            </a:p>
+            <a:p>
+              <a:pPr algn="r"/>
+              <a:r>
+                <a:rPr lang="en-US" sz="1200" dirty="0">
+                  <a:ln w="0"/>
+                  <a:solidFill>
+                    <a:schemeClr val="tx1"/>
+                  </a:solidFill>
+                  <a:effectLst>
+                    <a:outerShdw blurRad="38100" dist="19050" dir="2700000" algn="tl" rotWithShape="0">
+                      <a:schemeClr val="dk1">
+                        <a:alpha val="40000"/>
+                      </a:schemeClr>
+                    </a:outerShdw>
+                  </a:effectLst>
+                </a:rPr>
+                <a:t>YouTube: @yasenzhao</a:t>
+              </a:r>
+            </a:p>
+          </p:txBody>
+        </p:sp>
+        <p:pic>
+          <p:nvPicPr>
+            <p:cNvPr id="7" name="Picture 6">
+              <a:extLst>
+                <a:ext uri="{FF2B5EF4-FFF2-40B4-BE49-F238E27FC236}">
+                  <a16:creationId xmlns:a16="http://schemas.microsoft.com/office/drawing/2014/main" id="{5D5F1514-A194-2A55-DFE6-0000DADF64DA}"/>
+                </a:ext>
+              </a:extLst>
+            </p:cNvPr>
+            <p:cNvPicPr>
+              <a:picLocks noChangeAspect="1"/>
+            </p:cNvPicPr>
+            <p:nvPr/>
+          </p:nvPicPr>
+          <p:blipFill>
+            <a:blip r:embed="rId6">
+              <a:clrChange>
+                <a:clrFrom>
+                  <a:srgbClr val="FFFFFF"/>
+                </a:clrFrom>
+                <a:clrTo>
+                  <a:srgbClr val="FFFFFF">
+                    <a:alpha val="0"/>
+                  </a:srgbClr>
+                </a:clrTo>
+              </a:clrChange>
+            </a:blip>
+            <a:stretch>
+              <a:fillRect/>
+            </a:stretch>
+          </p:blipFill>
+          <p:spPr>
+            <a:xfrm>
+              <a:off x="9187981" y="6196988"/>
+              <a:ext cx="557286" cy="572984"/>
+            </a:xfrm>
+            <a:prstGeom prst="rect">
+              <a:avLst/>
+            </a:prstGeom>
+          </p:spPr>
+        </p:pic>
+      </p:grpSp>
+    </p:spTree>
+    <p:extLst>
+      <p:ext uri="{BB962C8B-B14F-4D97-AF65-F5344CB8AC3E}">
+        <p14:creationId xmlns:p14="http://schemas.microsoft.com/office/powerpoint/2010/main" val="4281973447"/>
+      </p:ext>
+    </p:extLst>
+  </p:cSld>
+  <p:clrMapOvr>
+    <a:masterClrMapping/>
+  </p:clrMapOvr>
+  <mc:AlternateContent xmlns:mc="http://schemas.openxmlformats.org/markup-compatibility/2006" xmlns:p14="http://schemas.microsoft.com/office/powerpoint/2010/main">
+    <mc:Choice Requires="p14">
+      <p:transition spd="med" p14:dur="700">
+        <p:fade/>
+      </p:transition>
+    </mc:Choice>
+    <mc:Fallback xmlns="">
+      <p:transition spd="med">
+        <p:fade/>
+      </p:transition>
+    </mc:Fallback>
+  </mc:AlternateContent>
+</p:sld>
+</file>
+
+<file path=ppt/slides/slide2.xml><?xml version="1.0" encoding="utf-8"?>
+<p:sld xmlns:a="http://schemas.openxmlformats.org/drawingml/2006/main" xmlns:r="http://schemas.openxmlformats.org/officeDocument/2006/relationships" xmlns:p="http://schemas.openxmlformats.org/presentationml/2006/main">
+  <p:cSld>
+    <p:spTree>
+      <p:nvGrpSpPr>
         <p:cNvPr id="1" name=""/>
         <p:cNvGrpSpPr/>
         <p:nvPr/>
@@ -4083,70 +4564,25 @@
             <a:spLocks noGrp="1"/>
           </p:cNvSpPr>
           <p:nvPr>
-            <p:ph type="ctrTitle"/>
-          </p:nvPr>
-        </p:nvSpPr>
-        <p:spPr/>
+            <p:ph type="title"/>
+          </p:nvPr>
+        </p:nvSpPr>
+        <p:spPr>
+          <a:xfrm>
+            <a:off x="2572871" y="466343"/>
+            <a:ext cx="5254394" cy="1362113"/>
+          </a:xfrm>
+        </p:spPr>
         <p:txBody>
           <a:bodyPr>
-            <a:normAutofit fontScale="90000"/>
+            <a:normAutofit/>
           </a:bodyPr>
           <a:lstStyle/>
           <a:p>
             <a:r>
-              <a:rPr lang="en-US" dirty="0"/>
-              <a:t>Doing Math </a:t>
-            </a:r>
-            <a:r>
-              <a:rPr lang="en-US"/>
-              <a:t>with Python</a:t>
-            </a:r>
-            <a:br>
-              <a:rPr lang="en-US"/>
-            </a:br>
-            <a:br>
-              <a:rPr lang="en-US" dirty="0"/>
-            </a:br>
-            <a:r>
-              <a:rPr lang="en-US" sz="5400" dirty="0"/>
-              <a:t>001 – Opening and Intro</a:t>
-            </a:r>
-            <a:endParaRPr lang="en-US" dirty="0"/>
-          </a:p>
-        </p:txBody>
-      </p:sp>
-      <p:sp>
-        <p:nvSpPr>
-          <p:cNvPr id="3" name="Subtitle 2"/>
-          <p:cNvSpPr>
-            <a:spLocks noGrp="1"/>
-          </p:cNvSpPr>
-          <p:nvPr>
-            <p:ph type="subTitle" idx="1"/>
-          </p:nvPr>
-        </p:nvSpPr>
-        <p:spPr/>
-        <p:txBody>
-          <a:bodyPr/>
-          <a:lstStyle/>
-          <a:p>
-            <a:r>
-              <a:rPr lang="en-US" dirty="0"/>
-              <a:t>Learning by Practicing</a:t>
-            </a:r>
-          </a:p>
-          <a:p>
-            <a:r>
-              <a:rPr lang="en-US" dirty="0"/>
-              <a:t>GitHub: </a:t>
-            </a:r>
-            <a:r>
-              <a:rPr lang="en-US" dirty="0">
-                <a:hlinkClick r:id="rId2"/>
-              </a:rPr>
-              <a:t>https://github.com/yasenstar/DoingMathWithPython</a:t>
-            </a:r>
-            <a:endParaRPr lang="en-US" dirty="0"/>
+              <a:rPr lang="en-US" sz="4000" dirty="0"/>
+              <a:t>Doing Math with Python</a:t>
+            </a:r>
           </a:p>
         </p:txBody>
       </p:sp>
@@ -4165,7 +4601,7 @@
           <p:nvPr/>
         </p:nvPicPr>
         <p:blipFill>
-          <a:blip r:embed="rId3">
+          <a:blip r:embed="rId2" cstate="print">
             <a:extLst>
               <a:ext uri="{28A0092B-C50C-407E-A947-70E740481C1C}">
                 <a14:useLocalDpi xmlns:a14="http://schemas.microsoft.com/office/drawing/2010/main" val="0"/>
@@ -4179,8 +4615,8 @@
         </p:blipFill>
         <p:spPr bwMode="auto">
           <a:xfrm>
-            <a:off x="498662" y="184923"/>
-            <a:ext cx="1805163" cy="1688701"/>
+            <a:off x="8238564" y="572984"/>
+            <a:ext cx="1228060" cy="1148830"/>
           </a:xfrm>
           <a:prstGeom prst="roundRect">
             <a:avLst>
@@ -4235,7 +4671,7 @@
           <p:nvPr/>
         </p:nvPicPr>
         <p:blipFill>
-          <a:blip r:embed="rId4">
+          <a:blip r:embed="rId3" cstate="print">
             <a:extLst>
               <a:ext uri="{28A0092B-C50C-407E-A947-70E740481C1C}">
                 <a14:useLocalDpi xmlns:a14="http://schemas.microsoft.com/office/drawing/2010/main" val="0"/>
@@ -4249,8 +4685,8 @@
         </p:blipFill>
         <p:spPr bwMode="auto">
           <a:xfrm>
-            <a:off x="94214" y="2054786"/>
-            <a:ext cx="2627369" cy="3469901"/>
+            <a:off x="9643621" y="563086"/>
+            <a:ext cx="873734" cy="1153919"/>
           </a:xfrm>
           <a:prstGeom prst="rect">
             <a:avLst/>
@@ -4276,6 +4712,623 @@
           </a:extLst>
         </p:spPr>
       </p:pic>
+      <p:sp>
+        <p:nvSpPr>
+          <p:cNvPr id="5" name="Subtitle 2">
+            <a:extLst>
+              <a:ext uri="{FF2B5EF4-FFF2-40B4-BE49-F238E27FC236}">
+                <a16:creationId xmlns:a16="http://schemas.microsoft.com/office/drawing/2014/main" id="{F1E28E59-E155-9E75-14BA-88BD4DE757BC}"/>
+              </a:ext>
+            </a:extLst>
+          </p:cNvPr>
+          <p:cNvSpPr txBox="1">
+            <a:spLocks/>
+          </p:cNvSpPr>
+          <p:nvPr/>
+        </p:nvSpPr>
+        <p:spPr>
+          <a:xfrm>
+            <a:off x="150607" y="5853952"/>
+            <a:ext cx="7370781" cy="919779"/>
+          </a:xfrm>
+          <a:prstGeom prst="rect">
+            <a:avLst/>
+          </a:prstGeom>
+        </p:spPr>
+        <p:txBody>
+          <a:bodyPr vert="horz" lIns="91440" tIns="45720" rIns="91440" bIns="45720" rtlCol="0">
+            <a:normAutofit lnSpcReduction="10000"/>
+          </a:bodyPr>
+          <a:lstStyle>
+            <a:lvl1pPr marL="228600" indent="-228600" algn="l" defTabSz="914400" rtl="0" eaLnBrk="1" latinLnBrk="0" hangingPunct="1">
+              <a:lnSpc>
+                <a:spcPct val="100000"/>
+              </a:lnSpc>
+              <a:spcBef>
+                <a:spcPts val="1500"/>
+              </a:spcBef>
+              <a:buFont typeface="Wingdings" panose="05000000000000000000" pitchFamily="2" charset="2"/>
+              <a:buChar char="§"/>
+              <a:defRPr sz="2200" kern="1200">
+                <a:solidFill>
+                  <a:schemeClr val="tx1"/>
+                </a:solidFill>
+                <a:latin typeface="+mn-lt"/>
+                <a:ea typeface="+mn-ea"/>
+                <a:cs typeface="+mn-cs"/>
+              </a:defRPr>
+            </a:lvl1pPr>
+            <a:lvl2pPr marL="685800" indent="-228600" algn="l" defTabSz="914400" rtl="0" eaLnBrk="1" latinLnBrk="0" hangingPunct="1">
+              <a:lnSpc>
+                <a:spcPct val="100000"/>
+              </a:lnSpc>
+              <a:spcBef>
+                <a:spcPts val="300"/>
+              </a:spcBef>
+              <a:buFont typeface="Wingdings" panose="05000000000000000000" pitchFamily="2" charset="2"/>
+              <a:buChar char="§"/>
+              <a:defRPr sz="2000" kern="1200">
+                <a:solidFill>
+                  <a:schemeClr val="tx1"/>
+                </a:solidFill>
+                <a:latin typeface="+mn-lt"/>
+                <a:ea typeface="+mn-ea"/>
+                <a:cs typeface="+mn-cs"/>
+              </a:defRPr>
+            </a:lvl2pPr>
+            <a:lvl3pPr marL="1143000" indent="-228600" algn="l" defTabSz="914400" rtl="0" eaLnBrk="1" latinLnBrk="0" hangingPunct="1">
+              <a:lnSpc>
+                <a:spcPct val="100000"/>
+              </a:lnSpc>
+              <a:spcBef>
+                <a:spcPts val="300"/>
+              </a:spcBef>
+              <a:buFont typeface="Wingdings" panose="05000000000000000000" pitchFamily="2" charset="2"/>
+              <a:buChar char="§"/>
+              <a:defRPr sz="1800" kern="1200">
+                <a:solidFill>
+                  <a:schemeClr val="tx1"/>
+                </a:solidFill>
+                <a:latin typeface="+mn-lt"/>
+                <a:ea typeface="+mn-ea"/>
+                <a:cs typeface="+mn-cs"/>
+              </a:defRPr>
+            </a:lvl3pPr>
+            <a:lvl4pPr marL="1600200" indent="-228600" algn="l" defTabSz="914400" rtl="0" eaLnBrk="1" latinLnBrk="0" hangingPunct="1">
+              <a:lnSpc>
+                <a:spcPct val="100000"/>
+              </a:lnSpc>
+              <a:spcBef>
+                <a:spcPts val="0"/>
+              </a:spcBef>
+              <a:buFont typeface="Wingdings" panose="05000000000000000000" pitchFamily="2" charset="2"/>
+              <a:buChar char="§"/>
+              <a:defRPr sz="1600" kern="1200">
+                <a:solidFill>
+                  <a:schemeClr val="tx1"/>
+                </a:solidFill>
+                <a:latin typeface="+mn-lt"/>
+                <a:ea typeface="+mn-ea"/>
+                <a:cs typeface="+mn-cs"/>
+              </a:defRPr>
+            </a:lvl4pPr>
+            <a:lvl5pPr marL="2057400" indent="-228600" algn="l" defTabSz="914400" rtl="0" eaLnBrk="1" latinLnBrk="0" hangingPunct="1">
+              <a:lnSpc>
+                <a:spcPct val="100000"/>
+              </a:lnSpc>
+              <a:spcBef>
+                <a:spcPts val="0"/>
+              </a:spcBef>
+              <a:buFont typeface="Wingdings" panose="05000000000000000000" pitchFamily="2" charset="2"/>
+              <a:buChar char="§"/>
+              <a:defRPr sz="1600" kern="1200">
+                <a:solidFill>
+                  <a:schemeClr val="tx1"/>
+                </a:solidFill>
+                <a:latin typeface="+mn-lt"/>
+                <a:ea typeface="+mn-ea"/>
+                <a:cs typeface="+mn-cs"/>
+              </a:defRPr>
+            </a:lvl5pPr>
+            <a:lvl6pPr marL="2514600" indent="-228600" algn="l" defTabSz="914400" rtl="0" eaLnBrk="1" latinLnBrk="0" hangingPunct="1">
+              <a:lnSpc>
+                <a:spcPct val="100000"/>
+              </a:lnSpc>
+              <a:spcBef>
+                <a:spcPts val="0"/>
+              </a:spcBef>
+              <a:buFont typeface="Wingdings" panose="05000000000000000000" pitchFamily="2" charset="2"/>
+              <a:buChar char="§"/>
+              <a:defRPr sz="1600" kern="1200">
+                <a:solidFill>
+                  <a:schemeClr val="tx1"/>
+                </a:solidFill>
+                <a:latin typeface="+mn-lt"/>
+                <a:ea typeface="+mn-ea"/>
+                <a:cs typeface="+mn-cs"/>
+              </a:defRPr>
+            </a:lvl6pPr>
+            <a:lvl7pPr marL="2971800" indent="-228600" algn="l" defTabSz="914400" rtl="0" eaLnBrk="1" latinLnBrk="0" hangingPunct="1">
+              <a:lnSpc>
+                <a:spcPct val="100000"/>
+              </a:lnSpc>
+              <a:spcBef>
+                <a:spcPts val="0"/>
+              </a:spcBef>
+              <a:buFont typeface="Wingdings" panose="05000000000000000000" pitchFamily="2" charset="2"/>
+              <a:buChar char="§"/>
+              <a:defRPr sz="1600" kern="1200">
+                <a:solidFill>
+                  <a:schemeClr val="tx1"/>
+                </a:solidFill>
+                <a:latin typeface="+mn-lt"/>
+                <a:ea typeface="+mn-ea"/>
+                <a:cs typeface="+mn-cs"/>
+              </a:defRPr>
+            </a:lvl7pPr>
+            <a:lvl8pPr marL="3429000" indent="-228600" algn="l" defTabSz="914400" rtl="0" eaLnBrk="1" latinLnBrk="0" hangingPunct="1">
+              <a:lnSpc>
+                <a:spcPct val="100000"/>
+              </a:lnSpc>
+              <a:spcBef>
+                <a:spcPts val="0"/>
+              </a:spcBef>
+              <a:buFont typeface="Wingdings" panose="05000000000000000000" pitchFamily="2" charset="2"/>
+              <a:buChar char="§"/>
+              <a:defRPr sz="1600" kern="1200">
+                <a:solidFill>
+                  <a:schemeClr val="tx1"/>
+                </a:solidFill>
+                <a:latin typeface="+mn-lt"/>
+                <a:ea typeface="+mn-ea"/>
+                <a:cs typeface="+mn-cs"/>
+              </a:defRPr>
+            </a:lvl8pPr>
+            <a:lvl9pPr marL="3886200" indent="-228600" algn="l" defTabSz="914400" rtl="0" eaLnBrk="1" latinLnBrk="0" hangingPunct="1">
+              <a:lnSpc>
+                <a:spcPct val="100000"/>
+              </a:lnSpc>
+              <a:spcBef>
+                <a:spcPts val="0"/>
+              </a:spcBef>
+              <a:buFont typeface="Wingdings" panose="05000000000000000000" pitchFamily="2" charset="2"/>
+              <a:buChar char="§"/>
+              <a:defRPr sz="1600" kern="1200">
+                <a:solidFill>
+                  <a:schemeClr val="tx1"/>
+                </a:solidFill>
+                <a:latin typeface="+mn-lt"/>
+                <a:ea typeface="+mn-ea"/>
+                <a:cs typeface="+mn-cs"/>
+              </a:defRPr>
+            </a:lvl9pPr>
+          </a:lstStyle>
+          <a:p>
+            <a:pPr marL="0" indent="0">
+              <a:buNone/>
+            </a:pPr>
+            <a:r>
+              <a:rPr lang="en-US"/>
+              <a:t>GitHub: </a:t>
+            </a:r>
+            <a:r>
+              <a:rPr lang="en-US">
+                <a:hlinkClick r:id="rId4"/>
+              </a:rPr>
+              <a:t>https://github.com/yasenstar/DoingMathWithPython</a:t>
+            </a:r>
+            <a:endParaRPr lang="en-US"/>
+          </a:p>
+          <a:p>
+            <a:pPr marL="0" indent="0">
+              <a:buNone/>
+            </a:pPr>
+            <a:r>
+              <a:rPr lang="en-US"/>
+              <a:t>Gitee: </a:t>
+            </a:r>
+            <a:r>
+              <a:rPr lang="en-US">
+                <a:hlinkClick r:id="rId5"/>
+              </a:rPr>
+              <a:t>https://gitee.com/yasenstar/DoingMathWithPython</a:t>
+            </a:r>
+            <a:endParaRPr lang="en-US" dirty="0"/>
+          </a:p>
+        </p:txBody>
+      </p:sp>
+      <p:pic>
+        <p:nvPicPr>
+          <p:cNvPr id="9" name="Content Placeholder 8">
+            <a:extLst>
+              <a:ext uri="{FF2B5EF4-FFF2-40B4-BE49-F238E27FC236}">
+                <a16:creationId xmlns:a16="http://schemas.microsoft.com/office/drawing/2014/main" id="{056D594D-14EC-9F44-B79A-A2F705E11EFF}"/>
+              </a:ext>
+            </a:extLst>
+          </p:cNvPr>
+          <p:cNvPicPr>
+            <a:picLocks noGrp="1" noChangeAspect="1"/>
+          </p:cNvPicPr>
+          <p:nvPr>
+            <p:ph idx="1"/>
+          </p:nvPr>
+        </p:nvPicPr>
+        <p:blipFill>
+          <a:blip r:embed="rId6"/>
+          <a:stretch>
+            <a:fillRect/>
+          </a:stretch>
+        </p:blipFill>
+        <p:spPr>
+          <a:xfrm>
+            <a:off x="6077606" y="2165304"/>
+            <a:ext cx="5953493" cy="3576917"/>
+          </a:xfrm>
+          <a:prstGeom prst="rect">
+            <a:avLst/>
+          </a:prstGeom>
+          <a:ln>
+            <a:noFill/>
+          </a:ln>
+          <a:effectLst>
+            <a:outerShdw blurRad="292100" dist="139700" dir="2700000" algn="tl" rotWithShape="0">
+              <a:srgbClr val="333333">
+                <a:alpha val="65000"/>
+              </a:srgbClr>
+            </a:outerShdw>
+          </a:effectLst>
+        </p:spPr>
+      </p:pic>
+      <p:sp>
+        <p:nvSpPr>
+          <p:cNvPr id="10" name="Title 1">
+            <a:extLst>
+              <a:ext uri="{FF2B5EF4-FFF2-40B4-BE49-F238E27FC236}">
+                <a16:creationId xmlns:a16="http://schemas.microsoft.com/office/drawing/2014/main" id="{CE6483B1-6C30-1324-AF7C-62524471DDE3}"/>
+              </a:ext>
+            </a:extLst>
+          </p:cNvPr>
+          <p:cNvSpPr txBox="1">
+            <a:spLocks/>
+          </p:cNvSpPr>
+          <p:nvPr/>
+        </p:nvSpPr>
+        <p:spPr bwMode="black">
+          <a:xfrm>
+            <a:off x="150607" y="2165304"/>
+            <a:ext cx="5926999" cy="3576917"/>
+          </a:xfrm>
+          <a:prstGeom prst="rect">
+            <a:avLst/>
+          </a:prstGeom>
+        </p:spPr>
+        <p:txBody>
+          <a:bodyPr vert="horz" lIns="91440" tIns="45720" rIns="91440" bIns="45720" rtlCol="0" anchor="ctr">
+            <a:normAutofit fontScale="92500"/>
+          </a:bodyPr>
+          <a:lstStyle>
+            <a:lvl1pPr algn="l" defTabSz="914400" rtl="0" eaLnBrk="1" latinLnBrk="0" hangingPunct="1">
+              <a:lnSpc>
+                <a:spcPct val="95000"/>
+              </a:lnSpc>
+              <a:spcBef>
+                <a:spcPct val="0"/>
+              </a:spcBef>
+              <a:buNone/>
+              <a:defRPr sz="3000" kern="1200">
+                <a:solidFill>
+                  <a:schemeClr val="bg1"/>
+                </a:solidFill>
+                <a:latin typeface="+mj-lt"/>
+                <a:ea typeface="+mj-ea"/>
+                <a:cs typeface="+mj-cs"/>
+              </a:defRPr>
+            </a:lvl1pPr>
+          </a:lstStyle>
+          <a:p>
+            <a:r>
+              <a:rPr lang="en-US" sz="4800" dirty="0">
+                <a:solidFill>
+                  <a:schemeClr val="tx2">
+                    <a:lumMod val="65000"/>
+                    <a:lumOff val="35000"/>
+                  </a:schemeClr>
+                </a:solidFill>
+              </a:rPr>
+              <a:t>Chapter 01: Working with Numbers</a:t>
+            </a:r>
+          </a:p>
+          <a:p>
+            <a:endParaRPr lang="en-US" sz="4800" dirty="0">
+              <a:solidFill>
+                <a:schemeClr val="tx2">
+                  <a:lumMod val="65000"/>
+                  <a:lumOff val="35000"/>
+                </a:schemeClr>
+              </a:solidFill>
+            </a:endParaRPr>
+          </a:p>
+          <a:p>
+            <a:r>
+              <a:rPr lang="en-US" sz="4400" dirty="0">
+                <a:solidFill>
+                  <a:schemeClr val="tx2">
+                    <a:lumMod val="65000"/>
+                    <a:lumOff val="35000"/>
+                  </a:schemeClr>
+                </a:solidFill>
+              </a:rPr>
+              <a:t>01-01 Basic Mathematical Operations</a:t>
+            </a:r>
+          </a:p>
+        </p:txBody>
+      </p:sp>
+      <p:sp>
+        <p:nvSpPr>
+          <p:cNvPr id="12" name="TextBox 11">
+            <a:extLst>
+              <a:ext uri="{FF2B5EF4-FFF2-40B4-BE49-F238E27FC236}">
+                <a16:creationId xmlns:a16="http://schemas.microsoft.com/office/drawing/2014/main" id="{7FD3167C-B41E-278B-0EBB-233BD7404155}"/>
+              </a:ext>
+            </a:extLst>
+          </p:cNvPr>
+          <p:cNvSpPr txBox="1"/>
+          <p:nvPr/>
+        </p:nvSpPr>
+        <p:spPr>
+          <a:xfrm>
+            <a:off x="295206" y="808845"/>
+            <a:ext cx="1892077" cy="677108"/>
+          </a:xfrm>
+          <a:prstGeom prst="rect">
+            <a:avLst/>
+          </a:prstGeom>
+        </p:spPr>
+        <p:txBody>
+          <a:bodyPr vert="horz" lIns="91440" tIns="45720" rIns="91440" bIns="45720" rtlCol="0" anchor="ctr">
+            <a:noAutofit/>
+          </a:bodyPr>
+          <a:lstStyle>
+            <a:lvl1pPr>
+              <a:lnSpc>
+                <a:spcPct val="95000"/>
+              </a:lnSpc>
+              <a:spcBef>
+                <a:spcPct val="0"/>
+              </a:spcBef>
+              <a:buNone/>
+              <a:defRPr sz="4000">
+                <a:solidFill>
+                  <a:schemeClr val="bg1"/>
+                </a:solidFill>
+                <a:latin typeface="+mj-lt"/>
+                <a:ea typeface="+mj-ea"/>
+                <a:cs typeface="+mj-cs"/>
+              </a:defRPr>
+            </a:lvl1pPr>
+          </a:lstStyle>
+          <a:p>
+            <a:pPr algn="ctr"/>
+            <a:r>
+              <a:rPr lang="en-US" sz="6600" b="1" dirty="0">
+                <a:effectLst>
+                  <a:outerShdw blurRad="38100" dist="38100" dir="2700000" algn="tl">
+                    <a:srgbClr val="000000">
+                      <a:alpha val="43137"/>
+                    </a:srgbClr>
+                  </a:outerShdw>
+                </a:effectLst>
+              </a:rPr>
+              <a:t>002</a:t>
+            </a:r>
+          </a:p>
+        </p:txBody>
+      </p:sp>
+      <p:pic>
+        <p:nvPicPr>
+          <p:cNvPr id="14" name="Picture 13">
+            <a:extLst>
+              <a:ext uri="{FF2B5EF4-FFF2-40B4-BE49-F238E27FC236}">
+                <a16:creationId xmlns:a16="http://schemas.microsoft.com/office/drawing/2014/main" id="{17DEC7CA-0207-326B-D2FC-E83D52C5EEBA}"/>
+              </a:ext>
+            </a:extLst>
+          </p:cNvPr>
+          <p:cNvPicPr>
+            <a:picLocks noChangeAspect="1"/>
+          </p:cNvPicPr>
+          <p:nvPr/>
+        </p:nvPicPr>
+        <p:blipFill>
+          <a:blip r:embed="rId7"/>
+          <a:stretch>
+            <a:fillRect/>
+          </a:stretch>
+        </p:blipFill>
+        <p:spPr>
+          <a:xfrm>
+            <a:off x="10694352" y="558277"/>
+            <a:ext cx="1228060" cy="1158728"/>
+          </a:xfrm>
+          <a:prstGeom prst="roundRect">
+            <a:avLst>
+              <a:gd name="adj" fmla="val 16667"/>
+            </a:avLst>
+          </a:prstGeom>
+          <a:ln>
+            <a:noFill/>
+          </a:ln>
+          <a:effectLst>
+            <a:outerShdw blurRad="76200" dist="38100" dir="7800000" algn="tl" rotWithShape="0">
+              <a:srgbClr val="000000">
+                <a:alpha val="40000"/>
+              </a:srgbClr>
+            </a:outerShdw>
+          </a:effectLst>
+          <a:scene3d>
+            <a:camera prst="orthographicFront"/>
+            <a:lightRig rig="contrasting" dir="t">
+              <a:rot lat="0" lon="0" rev="4200000"/>
+            </a:lightRig>
+          </a:scene3d>
+          <a:sp3d prstMaterial="plastic">
+            <a:bevelT w="381000" h="114300" prst="relaxedInset"/>
+            <a:contourClr>
+              <a:srgbClr val="969696"/>
+            </a:contourClr>
+          </a:sp3d>
+        </p:spPr>
+      </p:pic>
+      <p:grpSp>
+        <p:nvGrpSpPr>
+          <p:cNvPr id="19" name="Group 18">
+            <a:extLst>
+              <a:ext uri="{FF2B5EF4-FFF2-40B4-BE49-F238E27FC236}">
+                <a16:creationId xmlns:a16="http://schemas.microsoft.com/office/drawing/2014/main" id="{110A0CDD-B2CE-6D4B-FC8C-F248BB2CE427}"/>
+              </a:ext>
+            </a:extLst>
+          </p:cNvPr>
+          <p:cNvGrpSpPr/>
+          <p:nvPr/>
+        </p:nvGrpSpPr>
+        <p:grpSpPr>
+          <a:xfrm>
+            <a:off x="9144000" y="6143750"/>
+            <a:ext cx="2807208" cy="588020"/>
+            <a:chOff x="9034272" y="6189470"/>
+            <a:chExt cx="2807208" cy="588020"/>
+          </a:xfrm>
+        </p:grpSpPr>
+        <p:sp>
+          <p:nvSpPr>
+            <p:cNvPr id="20" name="Rectangle: Rounded Corners 19">
+              <a:extLst>
+                <a:ext uri="{FF2B5EF4-FFF2-40B4-BE49-F238E27FC236}">
+                  <a16:creationId xmlns:a16="http://schemas.microsoft.com/office/drawing/2014/main" id="{B8F30ACA-540E-49D4-04A9-7489A40C615D}"/>
+                </a:ext>
+              </a:extLst>
+            </p:cNvPr>
+            <p:cNvSpPr/>
+            <p:nvPr/>
+          </p:nvSpPr>
+          <p:spPr>
+            <a:xfrm>
+              <a:off x="9034272" y="6189470"/>
+              <a:ext cx="2807208" cy="588020"/>
+            </a:xfrm>
+            <a:prstGeom prst="roundRect">
+              <a:avLst/>
+            </a:prstGeom>
+            <a:solidFill>
+              <a:schemeClr val="accent1">
+                <a:lumMod val="20000"/>
+                <a:lumOff val="80000"/>
+              </a:schemeClr>
+            </a:solidFill>
+            <a:ln>
+              <a:noFill/>
+            </a:ln>
+          </p:spPr>
+          <p:style>
+            <a:lnRef idx="2">
+              <a:schemeClr val="accent1">
+                <a:shade val="15000"/>
+              </a:schemeClr>
+            </a:lnRef>
+            <a:fillRef idx="1">
+              <a:schemeClr val="accent1"/>
+            </a:fillRef>
+            <a:effectRef idx="0">
+              <a:schemeClr val="accent1"/>
+            </a:effectRef>
+            <a:fontRef idx="minor">
+              <a:schemeClr val="lt1"/>
+            </a:fontRef>
+          </p:style>
+          <p:txBody>
+            <a:bodyPr rtlCol="0" anchor="ctr"/>
+            <a:lstStyle/>
+            <a:p>
+              <a:pPr algn="r"/>
+              <a:r>
+                <a:rPr lang="en-US" sz="1200" dirty="0">
+                  <a:ln w="0"/>
+                  <a:solidFill>
+                    <a:schemeClr val="tx1"/>
+                  </a:solidFill>
+                  <a:effectLst>
+                    <a:outerShdw blurRad="38100" dist="19050" dir="2700000" algn="tl" rotWithShape="0">
+                      <a:schemeClr val="dk1">
+                        <a:alpha val="40000"/>
+                      </a:schemeClr>
+                    </a:outerShdw>
+                  </a:effectLst>
+                </a:rPr>
+                <a:t>Yasen – Enterprise Architecture</a:t>
+              </a:r>
+            </a:p>
+            <a:p>
+              <a:pPr algn="r"/>
+              <a:r>
+                <a:rPr lang="en-US" sz="1200" dirty="0">
+                  <a:ln w="0"/>
+                  <a:solidFill>
+                    <a:schemeClr val="tx1"/>
+                  </a:solidFill>
+                  <a:effectLst>
+                    <a:outerShdw blurRad="38100" dist="19050" dir="2700000" algn="tl" rotWithShape="0">
+                      <a:schemeClr val="dk1">
+                        <a:alpha val="40000"/>
+                      </a:schemeClr>
+                    </a:outerShdw>
+                  </a:effectLst>
+                </a:rPr>
+                <a:t>YouTube: @yasenzhao</a:t>
+              </a:r>
+            </a:p>
+          </p:txBody>
+        </p:sp>
+        <p:pic>
+          <p:nvPicPr>
+            <p:cNvPr id="21" name="Picture 20">
+              <a:extLst>
+                <a:ext uri="{FF2B5EF4-FFF2-40B4-BE49-F238E27FC236}">
+                  <a16:creationId xmlns:a16="http://schemas.microsoft.com/office/drawing/2014/main" id="{26A57FAB-F697-0937-F35F-BB08A62BA582}"/>
+                </a:ext>
+              </a:extLst>
+            </p:cNvPr>
+            <p:cNvPicPr>
+              <a:picLocks noChangeAspect="1"/>
+            </p:cNvPicPr>
+            <p:nvPr/>
+          </p:nvPicPr>
+          <p:blipFill>
+            <a:blip r:embed="rId8">
+              <a:clrChange>
+                <a:clrFrom>
+                  <a:srgbClr val="FFFFFF"/>
+                </a:clrFrom>
+                <a:clrTo>
+                  <a:srgbClr val="FFFFFF">
+                    <a:alpha val="0"/>
+                  </a:srgbClr>
+                </a:clrTo>
+              </a:clrChange>
+            </a:blip>
+            <a:stretch>
+              <a:fillRect/>
+            </a:stretch>
+          </p:blipFill>
+          <p:spPr>
+            <a:xfrm>
+              <a:off x="9187981" y="6196988"/>
+              <a:ext cx="557286" cy="572984"/>
+            </a:xfrm>
+            <a:prstGeom prst="rect">
+              <a:avLst/>
+            </a:prstGeom>
+          </p:spPr>
+        </p:pic>
+      </p:grpSp>
     </p:spTree>
     <p:extLst>
       <p:ext uri="{BB962C8B-B14F-4D97-AF65-F5344CB8AC3E}">

</xml_diff>